<commit_message>
switch to dashboard demo over cookies to prevent confusion
</commit_message>
<xml_diff>
--- a/2020-10-16 - NDC Sydney - The Background on Background Tasks in .NET Core/The Background on Background Tasks.pptx
+++ b/2020-10-16 - NDC Sydney - The Background on Background Tasks in .NET Core/The Background on Background Tasks.pptx
@@ -237,7 +237,7 @@
           <a:p>
             <a:fld id="{8EBF47D1-607F-45EE-AE63-C10CF3AC8DD9}" type="datetimeFigureOut">
               <a:rPr lang="en-US" smtClean="0"/>
-              <a:t>10/8/2020</a:t>
+              <a:t>10/11/2020</a:t>
             </a:fld>
             <a:endParaRPr lang="en-US"/>
           </a:p>
@@ -1598,7 +1598,10 @@
           <a:bodyPr/>
           <a:lstStyle/>
           <a:p>
-            <a:endParaRPr lang="en-US" dirty="0"/>
+            <a:r>
+              <a:rPr lang="en-US" dirty="0"/>
+              <a:t>When I made this talk, I had a certain audience in mind, so hopefully this is lines up with you, so that you can get the most out of this talk.  This talk targets existing .NET Core Developers who are familiar with the .NET Core/ASP.NET Core ecosystem and need to run a background task, but are maybe unsure of their options and which one to choose.</a:t>
+            </a:r>
           </a:p>
         </p:txBody>
       </p:sp>
@@ -3236,6 +3239,51 @@
               <a:t>Throw exception and show retry</a:t>
             </a:r>
           </a:p>
+          <a:p>
+            <a:pPr marL="0" indent="0">
+              <a:buFontTx/>
+              <a:buNone/>
+            </a:pPr>
+            <a:endParaRPr lang="en-US" dirty="0"/>
+          </a:p>
+          <a:p>
+            <a:pPr marL="0" indent="0">
+              <a:buFontTx/>
+              <a:buNone/>
+            </a:pPr>
+            <a:endParaRPr lang="en-US" dirty="0"/>
+          </a:p>
+          <a:p>
+            <a:pPr marL="0" indent="0">
+              <a:buFontTx/>
+              <a:buNone/>
+            </a:pPr>
+            <a:r>
+              <a:rPr lang="en-US" dirty="0"/>
+              <a:t>Note: </a:t>
+            </a:r>
+            <a:r>
+              <a:rPr lang="en-US" dirty="0" err="1"/>
+              <a:t>BackgroundJobService</a:t>
+            </a:r>
+            <a:r>
+              <a:rPr lang="en-US" dirty="0"/>
+              <a:t> is a </a:t>
+            </a:r>
+            <a:r>
+              <a:rPr lang="en-US" dirty="0" err="1"/>
+              <a:t>Hangfire</a:t>
+            </a:r>
+            <a:r>
+              <a:rPr lang="en-US" dirty="0"/>
+              <a:t> thing NOT a </a:t>
+            </a:r>
+            <a:r>
+              <a:rPr lang="en-US" dirty="0" err="1"/>
+              <a:t>BackgroundService</a:t>
+            </a:r>
+            <a:endParaRPr lang="en-US" dirty="0"/>
+          </a:p>
         </p:txBody>
       </p:sp>
       <p:sp>
@@ -3990,29 +4038,6 @@
           <a:bodyPr/>
           <a:lstStyle/>
           <a:p>
-            <a:pPr marL="0" marR="0" lvl="0" indent="0" algn="l" defTabSz="914400" rtl="0" eaLnBrk="1" fontAlgn="auto" latinLnBrk="0" hangingPunct="1">
-              <a:lnSpc>
-                <a:spcPct val="100000"/>
-              </a:lnSpc>
-              <a:spcBef>
-                <a:spcPts val="0"/>
-              </a:spcBef>
-              <a:spcAft>
-                <a:spcPts val="0"/>
-              </a:spcAft>
-              <a:buClrTx/>
-              <a:buSzTx/>
-              <a:buFontTx/>
-              <a:buNone/>
-              <a:tabLst/>
-              <a:defRPr/>
-            </a:pPr>
-            <a:r>
-              <a:rPr lang="en-US" dirty="0"/>
-              <a:t>25 year old DB that was multi-tenant where each customer had their own DB instances, each DB had thousands of DB objects, stored procedures that used Linked Servers, dead stored procedures referencing removed columns, etc.</a:t>
-            </a:r>
-          </a:p>
-          <a:p>
             <a:endParaRPr lang="en-US" dirty="0"/>
           </a:p>
         </p:txBody>
@@ -4270,7 +4295,7 @@
           <a:p>
             <a:r>
               <a:rPr lang="en-US" dirty="0"/>
-              <a:t>These options are kind of like baking cookies.  It goes from a make your own recipe to buying pre-packaged cookies.  Depending on what your requirements are, sometimes you might just reach for building your own recipe because you actually need to make a cookie cake and not individual cookies.  Other times you may just want to go to the store and buy cookies already pre-made in the box so you don’t have to worry about getting all the ingredients just right.</a:t>
+              <a:t>These options are kind of like baking cookies.  On one end of the spectrum, you have making your own recipe, where you have the raw ingredients, but it’s up to you how you want to assemble them and cook them and you have full control.  On the other end of the spectrum, you have going to the store and buying cookies off the shelf.  Obviously it’s way more convenient, but you have a lot less control over how the cookies are made and packaged.  Depending on what your requirements are, sometimes you may reach for one or the other depending on your scenario.</a:t>
             </a:r>
           </a:p>
         </p:txBody>
@@ -4542,7 +4567,7 @@
           <a:p>
             <a:fld id="{A4BF2526-C75C-47BE-928B-0135A92A66BE}" type="datetimeFigureOut">
               <a:rPr lang="en-US" smtClean="0"/>
-              <a:t>10/8/2020</a:t>
+              <a:t>10/11/2020</a:t>
             </a:fld>
             <a:endParaRPr lang="en-US"/>
           </a:p>
@@ -4740,7 +4765,7 @@
           <a:p>
             <a:fld id="{A4BF2526-C75C-47BE-928B-0135A92A66BE}" type="datetimeFigureOut">
               <a:rPr lang="en-US" smtClean="0"/>
-              <a:t>10/8/2020</a:t>
+              <a:t>10/11/2020</a:t>
             </a:fld>
             <a:endParaRPr lang="en-US"/>
           </a:p>
@@ -4948,7 +4973,7 @@
           <a:p>
             <a:fld id="{A4BF2526-C75C-47BE-928B-0135A92A66BE}" type="datetimeFigureOut">
               <a:rPr lang="en-US" smtClean="0"/>
-              <a:t>10/8/2020</a:t>
+              <a:t>10/11/2020</a:t>
             </a:fld>
             <a:endParaRPr lang="en-US"/>
           </a:p>
@@ -5146,7 +5171,7 @@
           <a:p>
             <a:fld id="{A4BF2526-C75C-47BE-928B-0135A92A66BE}" type="datetimeFigureOut">
               <a:rPr lang="en-US" smtClean="0"/>
-              <a:t>10/8/2020</a:t>
+              <a:t>10/11/2020</a:t>
             </a:fld>
             <a:endParaRPr lang="en-US"/>
           </a:p>
@@ -5421,7 +5446,7 @@
           <a:p>
             <a:fld id="{A4BF2526-C75C-47BE-928B-0135A92A66BE}" type="datetimeFigureOut">
               <a:rPr lang="en-US" smtClean="0"/>
-              <a:t>10/8/2020</a:t>
+              <a:t>10/11/2020</a:t>
             </a:fld>
             <a:endParaRPr lang="en-US"/>
           </a:p>
@@ -5686,7 +5711,7 @@
           <a:p>
             <a:fld id="{A4BF2526-C75C-47BE-928B-0135A92A66BE}" type="datetimeFigureOut">
               <a:rPr lang="en-US" smtClean="0"/>
-              <a:t>10/8/2020</a:t>
+              <a:t>10/11/2020</a:t>
             </a:fld>
             <a:endParaRPr lang="en-US"/>
           </a:p>
@@ -6098,7 +6123,7 @@
           <a:p>
             <a:fld id="{A4BF2526-C75C-47BE-928B-0135A92A66BE}" type="datetimeFigureOut">
               <a:rPr lang="en-US" smtClean="0"/>
-              <a:t>10/8/2020</a:t>
+              <a:t>10/11/2020</a:t>
             </a:fld>
             <a:endParaRPr lang="en-US"/>
           </a:p>
@@ -6239,7 +6264,7 @@
           <a:p>
             <a:fld id="{A4BF2526-C75C-47BE-928B-0135A92A66BE}" type="datetimeFigureOut">
               <a:rPr lang="en-US" smtClean="0"/>
-              <a:t>10/8/2020</a:t>
+              <a:t>10/11/2020</a:t>
             </a:fld>
             <a:endParaRPr lang="en-US"/>
           </a:p>
@@ -6352,7 +6377,7 @@
           <a:p>
             <a:fld id="{A4BF2526-C75C-47BE-928B-0135A92A66BE}" type="datetimeFigureOut">
               <a:rPr lang="en-US" smtClean="0"/>
-              <a:t>10/8/2020</a:t>
+              <a:t>10/11/2020</a:t>
             </a:fld>
             <a:endParaRPr lang="en-US"/>
           </a:p>
@@ -6663,7 +6688,7 @@
           <a:p>
             <a:fld id="{A4BF2526-C75C-47BE-928B-0135A92A66BE}" type="datetimeFigureOut">
               <a:rPr lang="en-US" smtClean="0"/>
-              <a:t>10/8/2020</a:t>
+              <a:t>10/11/2020</a:t>
             </a:fld>
             <a:endParaRPr lang="en-US"/>
           </a:p>
@@ -6951,7 +6976,7 @@
           <a:p>
             <a:fld id="{A4BF2526-C75C-47BE-928B-0135A92A66BE}" type="datetimeFigureOut">
               <a:rPr lang="en-US" smtClean="0"/>
-              <a:t>10/8/2020</a:t>
+              <a:t>10/11/2020</a:t>
             </a:fld>
             <a:endParaRPr lang="en-US"/>
           </a:p>
@@ -7192,7 +7217,7 @@
           <a:p>
             <a:fld id="{A4BF2526-C75C-47BE-928B-0135A92A66BE}" type="datetimeFigureOut">
               <a:rPr lang="en-US" smtClean="0"/>
-              <a:t>10/8/2020</a:t>
+              <a:t>10/11/2020</a:t>
             </a:fld>
             <a:endParaRPr lang="en-US"/>
           </a:p>
@@ -8214,12 +8239,6 @@
           <a:p>
             <a:r>
               <a:rPr lang="en-US" dirty="0"/>
-              <a:t>Raw, fundamental building block for other options</a:t>
-            </a:r>
-          </a:p>
-          <a:p>
-            <a:r>
-              <a:rPr lang="en-US" dirty="0"/>
               <a:t>Interface with </a:t>
             </a:r>
             <a:r>
@@ -8231,10 +8250,15 @@
               <a:t> and </a:t>
             </a:r>
             <a:r>
-              <a:rPr lang="en-US" dirty="0" err="1"/>
+              <a:rPr lang="en-US"/>
               <a:t>StopAsync</a:t>
             </a:r>
-            <a:endParaRPr lang="en-US" dirty="0"/>
+          </a:p>
+          <a:p>
+            <a:r>
+              <a:rPr lang="en-US" dirty="0"/>
+              <a:t>Raw, fundamental building block for other options</a:t>
+            </a:r>
           </a:p>
           <a:p>
             <a:r>
@@ -12149,7 +12173,7 @@
             </a:r>
             <a:r>
               <a:rPr lang="en-US" dirty="0"/>
-              <a:t> (more later)</a:t>
+              <a:t> (next)</a:t>
             </a:r>
           </a:p>
         </p:txBody>
@@ -14018,15 +14042,6 @@
               <a:t>In need of running a background task</a:t>
             </a:r>
           </a:p>
-          <a:p>
-            <a:r>
-              <a:rPr lang="en-US" dirty="0">
-                <a:ea typeface="Open Sans" panose="020B0606030504020204" pitchFamily="34" charset="0"/>
-                <a:cs typeface="Open Sans" panose="020B0606030504020204" pitchFamily="34" charset="0"/>
-              </a:rPr>
-              <a:t>Unaware of their options</a:t>
-            </a:r>
-          </a:p>
         </p:txBody>
       </p:sp>
       <p:grpSp>
@@ -14480,87 +14495,6 @@
                                           <p:spTgt spid="3">
                                             <p:txEl>
                                               <p:pRg st="1" end="1"/>
-                                            </p:txEl>
-                                          </p:spTgt>
-                                        </p:tgtEl>
-                                        <p:attrNameLst>
-                                          <p:attrName>ppt_c</p:attrName>
-                                        </p:attrNameLst>
-                                      </p:cBhvr>
-                                      <p:to>
-                                        <a:srgbClr val="B2B2B2"/>
-                                      </p:to>
-                                    </p:animClr>
-                                  </p:subTnLst>
-                                </p:cTn>
-                              </p:par>
-                            </p:childTnLst>
-                          </p:cTn>
-                        </p:par>
-                      </p:childTnLst>
-                    </p:cTn>
-                  </p:par>
-                  <p:par>
-                    <p:cTn id="13" fill="hold">
-                      <p:stCondLst>
-                        <p:cond delay="indefinite"/>
-                      </p:stCondLst>
-                      <p:childTnLst>
-                        <p:par>
-                          <p:cTn id="14" fill="hold">
-                            <p:stCondLst>
-                              <p:cond delay="0"/>
-                            </p:stCondLst>
-                            <p:childTnLst>
-                              <p:par>
-                                <p:cTn id="15" presetID="10" presetClass="entr" presetSubtype="0" fill="hold" grpId="0" nodeType="clickEffect">
-                                  <p:stCondLst>
-                                    <p:cond delay="0"/>
-                                  </p:stCondLst>
-                                  <p:childTnLst>
-                                    <p:set>
-                                      <p:cBhvr>
-                                        <p:cTn id="16" dur="1" fill="hold">
-                                          <p:stCondLst>
-                                            <p:cond delay="0"/>
-                                          </p:stCondLst>
-                                        </p:cTn>
-                                        <p:tgtEl>
-                                          <p:spTgt spid="3">
-                                            <p:txEl>
-                                              <p:pRg st="2" end="2"/>
-                                            </p:txEl>
-                                          </p:spTgt>
-                                        </p:tgtEl>
-                                        <p:attrNameLst>
-                                          <p:attrName>style.visibility</p:attrName>
-                                        </p:attrNameLst>
-                                      </p:cBhvr>
-                                      <p:to>
-                                        <p:strVal val="visible"/>
-                                      </p:to>
-                                    </p:set>
-                                    <p:animEffect transition="in" filter="fade">
-                                      <p:cBhvr>
-                                        <p:cTn id="17" dur="500"/>
-                                        <p:tgtEl>
-                                          <p:spTgt spid="3">
-                                            <p:txEl>
-                                              <p:pRg st="2" end="2"/>
-                                            </p:txEl>
-                                          </p:spTgt>
-                                        </p:tgtEl>
-                                      </p:cBhvr>
-                                    </p:animEffect>
-                                  </p:childTnLst>
-                                  <p:subTnLst>
-                                    <p:animClr clrSpc="rgb" dir="cw">
-                                      <p:cBhvr override="childStyle">
-                                        <p:cTn dur="1" fill="hold" display="0" masterRel="nextClick" afterEffect="1"/>
-                                        <p:tgtEl>
-                                          <p:spTgt spid="3">
-                                            <p:txEl>
-                                              <p:pRg st="2" end="2"/>
                                             </p:txEl>
                                           </p:spTgt>
                                         </p:tgtEl>
@@ -20287,6 +20221,12 @@
               <a:t>Avoid app pool recycles</a:t>
             </a:r>
           </a:p>
+          <a:p>
+            <a:r>
+              <a:rPr lang="en-US" dirty="0"/>
+              <a:t>Natural migration for a full .NET framework Windows Service</a:t>
+            </a:r>
+          </a:p>
         </p:txBody>
       </p:sp>
       <p:grpSp>
@@ -20803,6 +20743,87 @@
                                           <p:spTgt spid="3">
                                             <p:txEl>
                                               <p:pRg st="2" end="2"/>
+                                            </p:txEl>
+                                          </p:spTgt>
+                                        </p:tgtEl>
+                                        <p:attrNameLst>
+                                          <p:attrName>ppt_c</p:attrName>
+                                        </p:attrNameLst>
+                                      </p:cBhvr>
+                                      <p:to>
+                                        <a:srgbClr val="B2B2B2"/>
+                                      </p:to>
+                                    </p:animClr>
+                                  </p:subTnLst>
+                                </p:cTn>
+                              </p:par>
+                            </p:childTnLst>
+                          </p:cTn>
+                        </p:par>
+                      </p:childTnLst>
+                    </p:cTn>
+                  </p:par>
+                  <p:par>
+                    <p:cTn id="16" fill="hold">
+                      <p:stCondLst>
+                        <p:cond delay="indefinite"/>
+                      </p:stCondLst>
+                      <p:childTnLst>
+                        <p:par>
+                          <p:cTn id="17" fill="hold">
+                            <p:stCondLst>
+                              <p:cond delay="0"/>
+                            </p:stCondLst>
+                            <p:childTnLst>
+                              <p:par>
+                                <p:cTn id="18" presetID="10" presetClass="entr" presetSubtype="0" fill="hold" grpId="0" nodeType="clickEffect">
+                                  <p:stCondLst>
+                                    <p:cond delay="0"/>
+                                  </p:stCondLst>
+                                  <p:childTnLst>
+                                    <p:set>
+                                      <p:cBhvr>
+                                        <p:cTn id="19" dur="1" fill="hold">
+                                          <p:stCondLst>
+                                            <p:cond delay="0"/>
+                                          </p:stCondLst>
+                                        </p:cTn>
+                                        <p:tgtEl>
+                                          <p:spTgt spid="3">
+                                            <p:txEl>
+                                              <p:pRg st="3" end="3"/>
+                                            </p:txEl>
+                                          </p:spTgt>
+                                        </p:tgtEl>
+                                        <p:attrNameLst>
+                                          <p:attrName>style.visibility</p:attrName>
+                                        </p:attrNameLst>
+                                      </p:cBhvr>
+                                      <p:to>
+                                        <p:strVal val="visible"/>
+                                      </p:to>
+                                    </p:set>
+                                    <p:animEffect transition="in" filter="fade">
+                                      <p:cBhvr>
+                                        <p:cTn id="20" dur="500"/>
+                                        <p:tgtEl>
+                                          <p:spTgt spid="3">
+                                            <p:txEl>
+                                              <p:pRg st="3" end="3"/>
+                                            </p:txEl>
+                                          </p:spTgt>
+                                        </p:tgtEl>
+                                      </p:cBhvr>
+                                    </p:animEffect>
+                                  </p:childTnLst>
+                                  <p:subTnLst>
+                                    <p:animClr clrSpc="rgb" dir="cw">
+                                      <p:cBhvr override="childStyle">
+                                        <p:cTn dur="1" fill="hold" display="0" masterRel="nextClick" afterEffect="1"/>
+                                        <p:tgtEl>
+                                          <p:spTgt spid="3">
+                                            <p:txEl>
+                                              <p:pRg st="3" end="3"/>
                                             </p:txEl>
                                           </p:spTgt>
                                         </p:tgtEl>
@@ -29503,7 +29524,7 @@
           <a:p>
             <a:r>
               <a:rPr lang="en-US" dirty="0"/>
-              <a:t>Update ML datasets</a:t>
+              <a:t>Re-train ML datasets</a:t>
             </a:r>
           </a:p>
         </p:txBody>

</xml_diff>